<commit_message>
Modified & completed draft of Presentation
</commit_message>
<xml_diff>
--- a/Resources/Version Control Presentation.pptx
+++ b/Resources/Version Control Presentation.pptx
@@ -5,7 +5,7 @@
     <p:sldMasterId id="2147483648" r:id="rId1"/>
   </p:sldMasterIdLst>
   <p:notesMasterIdLst>
-    <p:notesMasterId r:id="rId30"/>
+    <p:notesMasterId r:id="rId32"/>
   </p:notesMasterIdLst>
   <p:sldIdLst>
     <p:sldId id="256" r:id="rId2"/>
@@ -36,6 +36,8 @@
     <p:sldId id="282" r:id="rId27"/>
     <p:sldId id="283" r:id="rId28"/>
     <p:sldId id="284" r:id="rId29"/>
+    <p:sldId id="285" r:id="rId30"/>
+    <p:sldId id="286" r:id="rId31"/>
   </p:sldIdLst>
   <p:sldSz cx="9144000" cy="6858000" type="screen4x3"/>
   <p:notesSz cx="6858000" cy="9144000"/>
@@ -250,7 +252,7 @@
             <a:fld id="{5330327B-49FA-4AE3-A857-EE35D8955E55}" type="datetimeFigureOut">
               <a:rPr lang="en-US" smtClean="0"/>
               <a:pPr/>
-              <a:t>4/19/2013</a:t>
+              <a:t>4/20/2013</a:t>
             </a:fld>
             <a:endParaRPr lang="en-US"/>
           </a:p>
@@ -419,7 +421,7 @@
     </p:spTree>
     <p:extLst>
       <p:ext uri="{BB962C8B-B14F-4D97-AF65-F5344CB8AC3E}">
-        <p14:creationId xmlns:p14="http://schemas.microsoft.com/office/powerpoint/2010/main" xmlns="" val="1001826066"/>
+        <p14:creationId xmlns="" xmlns:p14="http://schemas.microsoft.com/office/powerpoint/2010/main" val="1001826066"/>
       </p:ext>
     </p:extLst>
   </p:cSld>
@@ -658,7 +660,7 @@
     </p:spTree>
     <p:extLst>
       <p:ext uri="{BB962C8B-B14F-4D97-AF65-F5344CB8AC3E}">
-        <p14:creationId xmlns:p14="http://schemas.microsoft.com/office/powerpoint/2010/main" xmlns="" val="309394776"/>
+        <p14:creationId xmlns="" xmlns:p14="http://schemas.microsoft.com/office/powerpoint/2010/main" val="309394776"/>
       </p:ext>
     </p:extLst>
   </p:cSld>
@@ -751,7 +753,7 @@
     </p:spTree>
     <p:extLst>
       <p:ext uri="{BB962C8B-B14F-4D97-AF65-F5344CB8AC3E}">
-        <p14:creationId xmlns:p14="http://schemas.microsoft.com/office/powerpoint/2010/main" xmlns="" val="2037000757"/>
+        <p14:creationId xmlns="" xmlns:p14="http://schemas.microsoft.com/office/powerpoint/2010/main" val="2037000757"/>
       </p:ext>
     </p:extLst>
   </p:cSld>
@@ -4712,7 +4714,7 @@
           <a:blip r:embed="rId2" cstate="print">
             <a:extLst>
               <a:ext uri="{28A0092B-C50C-407E-A947-70E740481C1C}">
-                <a14:useLocalDpi xmlns:a14="http://schemas.microsoft.com/office/drawing/2010/main" xmlns="" val="0"/>
+                <a14:useLocalDpi xmlns="" xmlns:a14="http://schemas.microsoft.com/office/drawing/2010/main" val="0"/>
               </a:ext>
             </a:extLst>
           </a:blip>
@@ -4736,14 +4738,14 @@
           <a:effectLst/>
           <a:extLst>
             <a:ext uri="{909E8E84-426E-40DD-AFC4-6F175D3DCCD1}">
-              <a14:hiddenFill xmlns:a14="http://schemas.microsoft.com/office/drawing/2010/main" xmlns="">
+              <a14:hiddenFill xmlns="" xmlns:a14="http://schemas.microsoft.com/office/drawing/2010/main">
                 <a:solidFill>
                   <a:schemeClr val="accent1"/>
                 </a:solidFill>
               </a14:hiddenFill>
             </a:ext>
             <a:ext uri="{91240B29-F687-4F45-9708-019B960494DF}">
-              <a14:hiddenLine xmlns:a14="http://schemas.microsoft.com/office/drawing/2010/main" xmlns="" w="9525">
+              <a14:hiddenLine xmlns="" xmlns:a14="http://schemas.microsoft.com/office/drawing/2010/main" w="9525">
                 <a:solidFill>
                   <a:schemeClr val="tx1"/>
                 </a:solidFill>
@@ -4753,7 +4755,7 @@
               </a14:hiddenLine>
             </a:ext>
             <a:ext uri="{AF507438-7753-43E0-B8FC-AC1667EBCBE1}">
-              <a14:hiddenEffects xmlns:a14="http://schemas.microsoft.com/office/drawing/2010/main" xmlns="">
+              <a14:hiddenEffects xmlns="" xmlns:a14="http://schemas.microsoft.com/office/drawing/2010/main">
                 <a:effectLst>
                   <a:outerShdw dist="35921" dir="2700000" algn="ctr" rotWithShape="0">
                     <a:schemeClr val="bg2"/>
@@ -4767,7 +4769,7 @@
     </p:spTree>
     <p:extLst>
       <p:ext uri="{BB962C8B-B14F-4D97-AF65-F5344CB8AC3E}">
-        <p14:creationId xmlns:p14="http://schemas.microsoft.com/office/powerpoint/2010/main" xmlns="" val="485478141"/>
+        <p14:creationId xmlns="" xmlns:p14="http://schemas.microsoft.com/office/powerpoint/2010/main" val="485478141"/>
       </p:ext>
     </p:extLst>
   </p:cSld>
@@ -5135,7 +5137,7 @@
     </p:spTree>
     <p:extLst>
       <p:ext uri="{BB962C8B-B14F-4D97-AF65-F5344CB8AC3E}">
-        <p14:creationId xmlns:p14="http://schemas.microsoft.com/office/powerpoint/2010/main" xmlns="" val="3226579897"/>
+        <p14:creationId xmlns="" xmlns:p14="http://schemas.microsoft.com/office/powerpoint/2010/main" val="3226579897"/>
       </p:ext>
     </p:extLst>
   </p:cSld>
@@ -5385,7 +5387,7 @@
     </p:spTree>
     <p:extLst>
       <p:ext uri="{BB962C8B-B14F-4D97-AF65-F5344CB8AC3E}">
-        <p14:creationId xmlns:p14="http://schemas.microsoft.com/office/powerpoint/2010/main" xmlns="" val="4051427633"/>
+        <p14:creationId xmlns="" xmlns:p14="http://schemas.microsoft.com/office/powerpoint/2010/main" val="4051427633"/>
       </p:ext>
     </p:extLst>
   </p:cSld>
@@ -5512,7 +5514,7 @@
           <a:blip r:embed="rId3" cstate="print">
             <a:extLst>
               <a:ext uri="{28A0092B-C50C-407E-A947-70E740481C1C}">
-                <a14:useLocalDpi xmlns:a14="http://schemas.microsoft.com/office/drawing/2010/main" xmlns="" val="0"/>
+                <a14:useLocalDpi xmlns="" xmlns:a14="http://schemas.microsoft.com/office/drawing/2010/main" val="0"/>
               </a:ext>
             </a:extLst>
           </a:blip>
@@ -5534,14 +5536,14 @@
           <a:effectLst/>
           <a:extLst>
             <a:ext uri="{909E8E84-426E-40DD-AFC4-6F175D3DCCD1}">
-              <a14:hiddenFill xmlns:a14="http://schemas.microsoft.com/office/drawing/2010/main" xmlns="">
+              <a14:hiddenFill xmlns="" xmlns:a14="http://schemas.microsoft.com/office/drawing/2010/main">
                 <a:solidFill>
                   <a:schemeClr val="accent1"/>
                 </a:solidFill>
               </a14:hiddenFill>
             </a:ext>
             <a:ext uri="{91240B29-F687-4F45-9708-019B960494DF}">
-              <a14:hiddenLine xmlns:a14="http://schemas.microsoft.com/office/drawing/2010/main" xmlns="" w="9525">
+              <a14:hiddenLine xmlns="" xmlns:a14="http://schemas.microsoft.com/office/drawing/2010/main" w="9525">
                 <a:solidFill>
                   <a:schemeClr val="tx1"/>
                 </a:solidFill>
@@ -5551,7 +5553,7 @@
               </a14:hiddenLine>
             </a:ext>
             <a:ext uri="{AF507438-7753-43E0-B8FC-AC1667EBCBE1}">
-              <a14:hiddenEffects xmlns:a14="http://schemas.microsoft.com/office/drawing/2010/main" xmlns="">
+              <a14:hiddenEffects xmlns="" xmlns:a14="http://schemas.microsoft.com/office/drawing/2010/main">
                 <a:effectLst>
                   <a:outerShdw dist="35921" dir="2700000" algn="ctr" rotWithShape="0">
                     <a:schemeClr val="bg2"/>
@@ -5565,7 +5567,7 @@
     </p:spTree>
     <p:extLst>
       <p:ext uri="{BB962C8B-B14F-4D97-AF65-F5344CB8AC3E}">
-        <p14:creationId xmlns:p14="http://schemas.microsoft.com/office/powerpoint/2010/main" xmlns="" val="3725764809"/>
+        <p14:creationId xmlns="" xmlns:p14="http://schemas.microsoft.com/office/powerpoint/2010/main" val="3725764809"/>
       </p:ext>
     </p:extLst>
   </p:cSld>
@@ -5807,7 +5809,7 @@
     </p:spTree>
     <p:extLst>
       <p:ext uri="{BB962C8B-B14F-4D97-AF65-F5344CB8AC3E}">
-        <p14:creationId xmlns:p14="http://schemas.microsoft.com/office/powerpoint/2010/main" xmlns="" val="3516054452"/>
+        <p14:creationId xmlns="" xmlns:p14="http://schemas.microsoft.com/office/powerpoint/2010/main" val="3516054452"/>
       </p:ext>
     </p:extLst>
   </p:cSld>
@@ -5955,7 +5957,7 @@
     </p:spTree>
     <p:extLst>
       <p:ext uri="{BB962C8B-B14F-4D97-AF65-F5344CB8AC3E}">
-        <p14:creationId xmlns:p14="http://schemas.microsoft.com/office/powerpoint/2010/main" xmlns="" val="1120999154"/>
+        <p14:creationId xmlns="" xmlns:p14="http://schemas.microsoft.com/office/powerpoint/2010/main" val="1120999154"/>
       </p:ext>
     </p:extLst>
   </p:cSld>
@@ -6208,7 +6210,7 @@
     </p:spTree>
     <p:extLst>
       <p:ext uri="{BB962C8B-B14F-4D97-AF65-F5344CB8AC3E}">
-        <p14:creationId xmlns:p14="http://schemas.microsoft.com/office/powerpoint/2010/main" xmlns="" val="2229832477"/>
+        <p14:creationId xmlns="" xmlns:p14="http://schemas.microsoft.com/office/powerpoint/2010/main" val="2229832477"/>
       </p:ext>
     </p:extLst>
   </p:cSld>
@@ -6341,12 +6343,8 @@
           <a:p>
             <a:pPr lvl="1"/>
             <a:r>
-              <a:rPr lang="en-US" dirty="0" err="1" smtClean="0"/>
-              <a:t>Git</a:t>
-            </a:r>
-            <a:r>
-              <a:rPr lang="en-US" dirty="0" smtClean="0"/>
-              <a:t>?</a:t>
+              <a:rPr lang="en-US" dirty="0" smtClean="0"/>
+              <a:t>Git?</a:t>
             </a:r>
           </a:p>
           <a:p>
@@ -6590,7 +6588,7 @@
     </p:spTree>
     <p:extLst>
       <p:ext uri="{BB962C8B-B14F-4D97-AF65-F5344CB8AC3E}">
-        <p14:creationId xmlns:p14="http://schemas.microsoft.com/office/powerpoint/2010/main" xmlns="" val="2229832477"/>
+        <p14:creationId xmlns="" xmlns:p14="http://schemas.microsoft.com/office/powerpoint/2010/main" val="2229832477"/>
       </p:ext>
     </p:extLst>
   </p:cSld>
@@ -6814,13 +6812,8 @@
           <a:p>
             <a:r>
               <a:rPr lang="en-US" dirty="0" smtClean="0"/>
-              <a:t>The rest of this workshop will be using </a:t>
-            </a:r>
-            <a:r>
-              <a:rPr lang="en-US" dirty="0" err="1" smtClean="0"/>
-              <a:t>Git</a:t>
-            </a:r>
-            <a:endParaRPr lang="en-US" dirty="0" smtClean="0"/>
+              <a:t>The rest of this workshop will be using Git</a:t>
+            </a:r>
           </a:p>
           <a:p>
             <a:r>
@@ -6883,11 +6876,7 @@
           <a:p>
             <a:r>
               <a:rPr lang="en-US" dirty="0" smtClean="0"/>
-              <a:t>Let’s Try it With </a:t>
-            </a:r>
-            <a:r>
-              <a:rPr lang="en-US" dirty="0" err="1" smtClean="0"/>
-              <a:t>Git</a:t>
+              <a:t>Let’s Try it With Git</a:t>
             </a:r>
             <a:endParaRPr lang="en-US" dirty="0"/>
           </a:p>
@@ -6945,15 +6934,7 @@
           <a:p>
             <a:r>
               <a:rPr lang="en-US" dirty="0" smtClean="0"/>
-              <a:t>Open the </a:t>
-            </a:r>
-            <a:r>
-              <a:rPr lang="en-US" dirty="0" err="1" smtClean="0"/>
-              <a:t>Git</a:t>
-            </a:r>
-            <a:r>
-              <a:rPr lang="en-US" dirty="0" smtClean="0"/>
-              <a:t> </a:t>
+              <a:t>Open the Git </a:t>
             </a:r>
             <a:br>
               <a:rPr lang="en-US" dirty="0" smtClean="0"/>
@@ -7028,7 +7009,7 @@
     </p:spTree>
     <p:extLst>
       <p:ext uri="{BB962C8B-B14F-4D97-AF65-F5344CB8AC3E}">
-        <p14:creationId xmlns:p14="http://schemas.microsoft.com/office/powerpoint/2010/main" xmlns="" val="2101180154"/>
+        <p14:creationId xmlns="" xmlns:p14="http://schemas.microsoft.com/office/powerpoint/2010/main" val="2101180154"/>
       </p:ext>
     </p:extLst>
   </p:cSld>
@@ -7081,20 +7062,8 @@
           <a:lstStyle/>
           <a:p>
             <a:r>
-              <a:rPr lang="en-US" dirty="0" err="1" smtClean="0"/>
-              <a:t>Git</a:t>
-            </a:r>
-            <a:r>
-              <a:rPr lang="en-US" dirty="0" smtClean="0"/>
-              <a:t> Setup (w/</a:t>
-            </a:r>
-            <a:r>
-              <a:rPr lang="en-US" dirty="0" err="1" smtClean="0"/>
-              <a:t>Git</a:t>
-            </a:r>
-            <a:r>
-              <a:rPr lang="en-US" dirty="0" smtClean="0"/>
-              <a:t>-Bash)</a:t>
+              <a:rPr lang="en-US" dirty="0" smtClean="0"/>
+              <a:t>Git Setup (w/Git-Bash)</a:t>
             </a:r>
             <a:endParaRPr lang="en-US" dirty="0"/>
           </a:p>
@@ -7243,19 +7212,7 @@
             <a:pPr lvl="1"/>
             <a:r>
               <a:rPr lang="en-US" dirty="0" smtClean="0"/>
-              <a:t>you can have direct access to the </a:t>
-            </a:r>
-            <a:r>
-              <a:rPr lang="en-US" dirty="0" err="1" smtClean="0"/>
-              <a:t>Git</a:t>
-            </a:r>
-            <a:r>
-              <a:rPr lang="en-US" dirty="0" smtClean="0"/>
-              <a:t> </a:t>
-            </a:r>
-            <a:r>
-              <a:rPr lang="en-US" dirty="0" smtClean="0"/>
-              <a:t>Repository</a:t>
+              <a:t>you can have direct access to the Git Repository</a:t>
             </a:r>
           </a:p>
           <a:p>
@@ -7313,15 +7270,7 @@
           <a:p>
             <a:r>
               <a:rPr lang="en-US" dirty="0" smtClean="0"/>
-              <a:t>Our First </a:t>
-            </a:r>
-            <a:r>
-              <a:rPr lang="en-US" dirty="0" err="1" smtClean="0"/>
-              <a:t>Git</a:t>
-            </a:r>
-            <a:r>
-              <a:rPr lang="en-US" dirty="0" smtClean="0"/>
-              <a:t> Clone</a:t>
+              <a:t>Our First Git Clone</a:t>
             </a:r>
             <a:endParaRPr lang="en-US" dirty="0"/>
           </a:p>
@@ -7360,101 +7309,251 @@
           <a:p>
             <a:pPr lvl="1"/>
             <a:r>
-              <a:rPr lang="en-US" dirty="0" smtClean="0"/>
+              <a:rPr lang="en-US" b="1" dirty="0" smtClean="0">
+                <a:solidFill>
+                  <a:srgbClr val="FFFF00"/>
+                </a:solidFill>
+                <a:effectLst>
+                  <a:outerShdw blurRad="38100" dist="38100" dir="2700000" algn="tl">
+                    <a:srgbClr val="000000">
+                      <a:alpha val="43137"/>
+                    </a:srgbClr>
+                  </a:outerShdw>
+                </a:effectLst>
+              </a:rPr>
               <a:t>$ </a:t>
             </a:r>
+            <a:r>
+              <a:rPr lang="en-US" b="1" dirty="0" err="1" smtClean="0">
+                <a:solidFill>
+                  <a:srgbClr val="FFFF00"/>
+                </a:solidFill>
+                <a:effectLst>
+                  <a:outerShdw blurRad="38100" dist="38100" dir="2700000" algn="tl">
+                    <a:srgbClr val="000000">
+                      <a:alpha val="43137"/>
+                    </a:srgbClr>
+                  </a:outerShdw>
+                </a:effectLst>
+              </a:rPr>
+              <a:t>cd</a:t>
+            </a:r>
+            <a:r>
+              <a:rPr lang="en-US" b="1" dirty="0" smtClean="0">
+                <a:solidFill>
+                  <a:srgbClr val="FFFF00"/>
+                </a:solidFill>
+                <a:effectLst>
+                  <a:outerShdw blurRad="38100" dist="38100" dir="2700000" algn="tl">
+                    <a:srgbClr val="000000">
+                      <a:alpha val="43137"/>
+                    </a:srgbClr>
+                  </a:outerShdw>
+                </a:effectLst>
+              </a:rPr>
+              <a:t> G:/SCM</a:t>
+            </a:r>
+          </a:p>
+          <a:p>
+            <a:pPr lvl="2"/>
             <a:r>
               <a:rPr lang="en-US" dirty="0" err="1" smtClean="0"/>
               <a:t>cd</a:t>
             </a:r>
             <a:r>
               <a:rPr lang="en-US" dirty="0" smtClean="0"/>
-              <a:t> G:/SCM</a:t>
-            </a:r>
-          </a:p>
-          <a:p>
-            <a:pPr lvl="2"/>
-            <a:r>
-              <a:rPr lang="en-US" dirty="0" err="1" smtClean="0"/>
+              <a:t> = change directory</a:t>
+            </a:r>
+          </a:p>
+          <a:p>
+            <a:r>
+              <a:rPr lang="en-US" dirty="0" smtClean="0"/>
+              <a:t>Create a directory for your clone</a:t>
+            </a:r>
+          </a:p>
+          <a:p>
+            <a:pPr lvl="1"/>
+            <a:r>
+              <a:rPr lang="en-US" b="1" dirty="0" smtClean="0">
+                <a:solidFill>
+                  <a:srgbClr val="FFFF00"/>
+                </a:solidFill>
+                <a:effectLst>
+                  <a:outerShdw blurRad="38100" dist="38100" dir="2700000" algn="tl">
+                    <a:srgbClr val="000000">
+                      <a:alpha val="43137"/>
+                    </a:srgbClr>
+                  </a:outerShdw>
+                </a:effectLst>
+              </a:rPr>
+              <a:t>$ </a:t>
+            </a:r>
+            <a:r>
+              <a:rPr lang="en-US" b="1" dirty="0" err="1" smtClean="0">
+                <a:solidFill>
+                  <a:srgbClr val="FFFF00"/>
+                </a:solidFill>
+                <a:effectLst>
+                  <a:outerShdw blurRad="38100" dist="38100" dir="2700000" algn="tl">
+                    <a:srgbClr val="000000">
+                      <a:alpha val="43137"/>
+                    </a:srgbClr>
+                  </a:outerShdw>
+                </a:effectLst>
+              </a:rPr>
+              <a:t>mkdir</a:t>
+            </a:r>
+            <a:r>
+              <a:rPr lang="en-US" b="1" dirty="0" smtClean="0">
+                <a:solidFill>
+                  <a:srgbClr val="FFFF00"/>
+                </a:solidFill>
+                <a:effectLst>
+                  <a:outerShdw blurRad="38100" dist="38100" dir="2700000" algn="tl">
+                    <a:srgbClr val="000000">
+                      <a:alpha val="43137"/>
+                    </a:srgbClr>
+                  </a:outerShdw>
+                </a:effectLst>
+              </a:rPr>
+              <a:t> ‘</a:t>
+            </a:r>
+            <a:r>
+              <a:rPr lang="en-US" b="1" dirty="0" err="1" smtClean="0">
+                <a:solidFill>
+                  <a:srgbClr val="FFFF00"/>
+                </a:solidFill>
+                <a:effectLst>
+                  <a:outerShdw blurRad="38100" dist="38100" dir="2700000" algn="tl">
+                    <a:srgbClr val="000000">
+                      <a:alpha val="43137"/>
+                    </a:srgbClr>
+                  </a:outerShdw>
+                </a:effectLst>
+              </a:rPr>
+              <a:t>TechStartClone</a:t>
+            </a:r>
+            <a:r>
+              <a:rPr lang="en-US" b="1" dirty="0" smtClean="0">
+                <a:solidFill>
+                  <a:srgbClr val="FFFF00"/>
+                </a:solidFill>
+                <a:effectLst>
+                  <a:outerShdw blurRad="38100" dist="38100" dir="2700000" algn="tl">
+                    <a:srgbClr val="000000">
+                      <a:alpha val="43137"/>
+                    </a:srgbClr>
+                  </a:outerShdw>
+                </a:effectLst>
+              </a:rPr>
+              <a:t>’</a:t>
+            </a:r>
+          </a:p>
+          <a:p>
+            <a:r>
+              <a:rPr lang="en-US" dirty="0" smtClean="0"/>
+              <a:t>Navigate to the Clone</a:t>
+            </a:r>
+          </a:p>
+          <a:p>
+            <a:pPr lvl="1"/>
+            <a:r>
+              <a:rPr lang="en-US" b="1" dirty="0" smtClean="0">
+                <a:solidFill>
+                  <a:srgbClr val="FFFF00"/>
+                </a:solidFill>
+                <a:effectLst>
+                  <a:outerShdw blurRad="38100" dist="38100" dir="2700000" algn="tl">
+                    <a:srgbClr val="000000">
+                      <a:alpha val="43137"/>
+                    </a:srgbClr>
+                  </a:outerShdw>
+                </a:effectLst>
+              </a:rPr>
+              <a:t>$ </a:t>
+            </a:r>
+            <a:r>
+              <a:rPr lang="en-US" b="1" dirty="0" err="1" smtClean="0">
+                <a:solidFill>
+                  <a:srgbClr val="FFFF00"/>
+                </a:solidFill>
+                <a:effectLst>
+                  <a:outerShdw blurRad="38100" dist="38100" dir="2700000" algn="tl">
+                    <a:srgbClr val="000000">
+                      <a:alpha val="43137"/>
+                    </a:srgbClr>
+                  </a:outerShdw>
+                </a:effectLst>
+              </a:rPr>
               <a:t>cd</a:t>
             </a:r>
             <a:r>
-              <a:rPr lang="en-US" dirty="0" smtClean="0"/>
-              <a:t> = change directory</a:t>
-            </a:r>
-          </a:p>
-          <a:p>
-            <a:r>
-              <a:rPr lang="en-US" dirty="0" smtClean="0"/>
-              <a:t>Create </a:t>
-            </a:r>
-            <a:r>
-              <a:rPr lang="en-US" dirty="0" smtClean="0"/>
-              <a:t>a directory for your clone</a:t>
+              <a:rPr lang="en-US" b="1" dirty="0" smtClean="0">
+                <a:solidFill>
+                  <a:srgbClr val="FFFF00"/>
+                </a:solidFill>
+                <a:effectLst>
+                  <a:outerShdw blurRad="38100" dist="38100" dir="2700000" algn="tl">
+                    <a:srgbClr val="000000">
+                      <a:alpha val="43137"/>
+                    </a:srgbClr>
+                  </a:outerShdw>
+                </a:effectLst>
+              </a:rPr>
+              <a:t> G:/SCM/TechStartClone</a:t>
+            </a:r>
+          </a:p>
+          <a:p>
+            <a:r>
+              <a:rPr lang="en-US" dirty="0" smtClean="0"/>
+              <a:t>Initialize your Folder </a:t>
             </a:r>
           </a:p>
           <a:p>
             <a:pPr lvl="1"/>
             <a:r>
-              <a:rPr lang="en-US" dirty="0" smtClean="0"/>
+              <a:rPr lang="en-US" b="1" dirty="0" smtClean="0">
+                <a:solidFill>
+                  <a:srgbClr val="FFFF00"/>
+                </a:solidFill>
+                <a:effectLst>
+                  <a:outerShdw blurRad="38100" dist="38100" dir="2700000" algn="tl">
+                    <a:srgbClr val="000000">
+                      <a:alpha val="43137"/>
+                    </a:srgbClr>
+                  </a:outerShdw>
+                </a:effectLst>
+              </a:rPr>
               <a:t>$ </a:t>
             </a:r>
             <a:r>
-              <a:rPr lang="en-US" dirty="0" err="1" smtClean="0"/>
-              <a:t>mkdir</a:t>
-            </a:r>
-            <a:r>
-              <a:rPr lang="en-US" dirty="0" smtClean="0"/>
-              <a:t> ‘</a:t>
-            </a:r>
-            <a:r>
-              <a:rPr lang="en-US" dirty="0" err="1" smtClean="0"/>
-              <a:t>TechStartClone</a:t>
-            </a:r>
-            <a:r>
-              <a:rPr lang="en-US" dirty="0" smtClean="0"/>
-              <a:t>’</a:t>
-            </a:r>
-          </a:p>
-          <a:p>
-            <a:r>
-              <a:rPr lang="en-US" dirty="0" smtClean="0"/>
-              <a:t>Navigate to the Clone</a:t>
-            </a:r>
-          </a:p>
-          <a:p>
-            <a:pPr lvl="1"/>
-            <a:r>
-              <a:rPr lang="en-US" dirty="0" smtClean="0"/>
-              <a:t>$ </a:t>
-            </a:r>
-            <a:r>
-              <a:rPr lang="en-US" dirty="0" err="1" smtClean="0"/>
-              <a:t>cd</a:t>
-            </a:r>
-            <a:r>
-              <a:rPr lang="en-US" dirty="0" smtClean="0"/>
-              <a:t> G:/SCM/TechStartClone</a:t>
-            </a:r>
-          </a:p>
-          <a:p>
-            <a:r>
-              <a:rPr lang="en-US" dirty="0" smtClean="0"/>
-              <a:t>Initialize your Folder </a:t>
-            </a:r>
-          </a:p>
-          <a:p>
-            <a:pPr lvl="1"/>
-            <a:r>
-              <a:rPr lang="en-US" dirty="0" smtClean="0"/>
-              <a:t>$ </a:t>
-            </a:r>
-            <a:r>
-              <a:rPr lang="en-US" dirty="0" err="1" smtClean="0"/>
+              <a:rPr lang="en-US" b="1" dirty="0" err="1" smtClean="0">
+                <a:solidFill>
+                  <a:srgbClr val="FFFF00"/>
+                </a:solidFill>
+                <a:effectLst>
+                  <a:outerShdw blurRad="38100" dist="38100" dir="2700000" algn="tl">
+                    <a:srgbClr val="000000">
+                      <a:alpha val="43137"/>
+                    </a:srgbClr>
+                  </a:outerShdw>
+                </a:effectLst>
+              </a:rPr>
               <a:t>git</a:t>
             </a:r>
             <a:r>
-              <a:rPr lang="en-US" dirty="0" smtClean="0"/>
+              <a:rPr lang="en-US" b="1" dirty="0" smtClean="0">
+                <a:solidFill>
+                  <a:srgbClr val="FFFF00"/>
+                </a:solidFill>
+                <a:effectLst>
+                  <a:outerShdw blurRad="38100" dist="38100" dir="2700000" algn="tl">
+                    <a:srgbClr val="000000">
+                      <a:alpha val="43137"/>
+                    </a:srgbClr>
+                  </a:outerShdw>
+                </a:effectLst>
+              </a:rPr>
               <a:t> init</a:t>
             </a:r>
           </a:p>
@@ -7475,15 +7574,48 @@
           <a:p>
             <a:pPr lvl="1"/>
             <a:r>
-              <a:rPr lang="en-US" dirty="0" smtClean="0"/>
+              <a:rPr lang="en-US" b="1" dirty="0" smtClean="0">
+                <a:solidFill>
+                  <a:srgbClr val="FFFF00"/>
+                </a:solidFill>
+                <a:effectLst>
+                  <a:outerShdw blurRad="38100" dist="38100" dir="2700000" algn="tl">
+                    <a:srgbClr val="000000">
+                      <a:alpha val="43137"/>
+                    </a:srgbClr>
+                  </a:outerShdw>
+                </a:effectLst>
+              </a:rPr>
               <a:t>$ </a:t>
             </a:r>
             <a:r>
-              <a:rPr lang="en-US" dirty="0" err="1" smtClean="0"/>
+              <a:rPr lang="en-US" b="1" dirty="0" err="1" smtClean="0">
+                <a:solidFill>
+                  <a:srgbClr val="FFFF00"/>
+                </a:solidFill>
+                <a:effectLst>
+                  <a:outerShdw blurRad="38100" dist="38100" dir="2700000" algn="tl">
+                    <a:srgbClr val="000000">
+                      <a:alpha val="43137"/>
+                    </a:srgbClr>
+                  </a:outerShdw>
+                </a:effectLst>
+              </a:rPr>
               <a:t>git</a:t>
             </a:r>
             <a:r>
-              <a:rPr lang="en-US" dirty="0" smtClean="0"/>
+              <a:rPr lang="en-US" b="1" dirty="0" smtClean="0">
+                <a:solidFill>
+                  <a:srgbClr val="FFFF00"/>
+                </a:solidFill>
+                <a:effectLst>
+                  <a:outerShdw blurRad="38100" dist="38100" dir="2700000" algn="tl">
+                    <a:srgbClr val="000000">
+                      <a:alpha val="43137"/>
+                    </a:srgbClr>
+                  </a:outerShdw>
+                </a:effectLst>
+              </a:rPr>
               <a:t> clone https://github.com/HundredVisionsGuy/techstart-spring-conference.git</a:t>
             </a:r>
           </a:p>
@@ -7580,22 +7712,50 @@
           <a:p>
             <a:pPr lvl="1"/>
             <a:r>
-              <a:rPr lang="en-US" dirty="0" smtClean="0"/>
+              <a:rPr lang="en-US" b="1" dirty="0" smtClean="0">
+                <a:solidFill>
+                  <a:srgbClr val="FFFF00"/>
+                </a:solidFill>
+                <a:effectLst>
+                  <a:outerShdw blurRad="38100" dist="38100" dir="2700000" algn="tl">
+                    <a:srgbClr val="000000">
+                      <a:alpha val="43137"/>
+                    </a:srgbClr>
+                  </a:outerShdw>
+                </a:effectLst>
+              </a:rPr>
               <a:t>$ </a:t>
             </a:r>
             <a:r>
-              <a:rPr lang="en-US" dirty="0" err="1" smtClean="0"/>
+              <a:rPr lang="en-US" b="1" dirty="0" err="1" smtClean="0">
+                <a:solidFill>
+                  <a:srgbClr val="FFFF00"/>
+                </a:solidFill>
+                <a:effectLst>
+                  <a:outerShdw blurRad="38100" dist="38100" dir="2700000" algn="tl">
+                    <a:srgbClr val="000000">
+                      <a:alpha val="43137"/>
+                    </a:srgbClr>
+                  </a:outerShdw>
+                </a:effectLst>
+              </a:rPr>
               <a:t>git</a:t>
             </a:r>
             <a:r>
-              <a:rPr lang="en-US" dirty="0" smtClean="0"/>
-              <a:t> remote add upstream </a:t>
-            </a:r>
-            <a:r>
-              <a:rPr lang="en-US" dirty="0" smtClean="0"/>
-              <a:t>https://github.com/HundredVisionsGuy/techstart-spring-conference.git</a:t>
-            </a:r>
-            <a:endParaRPr lang="en-US" dirty="0" smtClean="0"/>
+              <a:rPr lang="en-US" b="1" dirty="0" smtClean="0">
+                <a:solidFill>
+                  <a:srgbClr val="FFFF00"/>
+                </a:solidFill>
+                <a:effectLst>
+                  <a:outerShdw blurRad="38100" dist="38100" dir="2700000" algn="tl">
+                    <a:srgbClr val="000000">
+                      <a:alpha val="43137"/>
+                    </a:srgbClr>
+                  </a:outerShdw>
+                </a:effectLst>
+              </a:rPr>
+              <a:t> remote add upstream https://github.com/HundredVisionsGuy/techstart-spring-conference.git</a:t>
+            </a:r>
           </a:p>
           <a:p>
             <a:r>
@@ -7612,15 +7772,27 @@
           <a:p>
             <a:pPr lvl="1"/>
             <a:r>
-              <a:rPr lang="en-US" dirty="0" smtClean="0"/>
+              <a:rPr lang="en-US" b="1" dirty="0" smtClean="0">
+                <a:solidFill>
+                  <a:srgbClr val="FFFF00"/>
+                </a:solidFill>
+              </a:rPr>
               <a:t>$ </a:t>
             </a:r>
             <a:r>
-              <a:rPr lang="en-US" dirty="0" err="1" smtClean="0"/>
+              <a:rPr lang="en-US" b="1" dirty="0" err="1" smtClean="0">
+                <a:solidFill>
+                  <a:srgbClr val="FFFF00"/>
+                </a:solidFill>
+              </a:rPr>
               <a:t>git</a:t>
             </a:r>
             <a:r>
-              <a:rPr lang="en-US" dirty="0" smtClean="0"/>
+              <a:rPr lang="en-US" b="1" dirty="0" smtClean="0">
+                <a:solidFill>
+                  <a:srgbClr val="FFFF00"/>
+                </a:solidFill>
+              </a:rPr>
               <a:t> add -A</a:t>
             </a:r>
           </a:p>
@@ -7704,28 +7876,79 @@
           </a:p>
           <a:p>
             <a:r>
-              <a:rPr lang="en-US" dirty="0" smtClean="0"/>
+              <a:rPr lang="en-US" b="1" dirty="0" smtClean="0">
+                <a:solidFill>
+                  <a:srgbClr val="FFFF00"/>
+                </a:solidFill>
+                <a:effectLst>
+                  <a:outerShdw blurRad="38100" dist="38100" dir="2700000" algn="tl">
+                    <a:srgbClr val="000000">
+                      <a:alpha val="43137"/>
+                    </a:srgbClr>
+                  </a:outerShdw>
+                </a:effectLst>
+              </a:rPr>
               <a:t>$ </a:t>
             </a:r>
             <a:r>
-              <a:rPr lang="en-US" dirty="0" err="1" smtClean="0"/>
+              <a:rPr lang="en-US" b="1" dirty="0" err="1" smtClean="0">
+                <a:solidFill>
+                  <a:srgbClr val="FFFF00"/>
+                </a:solidFill>
+                <a:effectLst>
+                  <a:outerShdw blurRad="38100" dist="38100" dir="2700000" algn="tl">
+                    <a:srgbClr val="000000">
+                      <a:alpha val="43137"/>
+                    </a:srgbClr>
+                  </a:outerShdw>
+                </a:effectLst>
+              </a:rPr>
               <a:t>git</a:t>
             </a:r>
             <a:r>
-              <a:rPr lang="en-US" dirty="0" smtClean="0"/>
+              <a:rPr lang="en-US" b="1" dirty="0" smtClean="0">
+                <a:solidFill>
+                  <a:srgbClr val="FFFF00"/>
+                </a:solidFill>
+                <a:effectLst>
+                  <a:outerShdw blurRad="38100" dist="38100" dir="2700000" algn="tl">
+                    <a:srgbClr val="000000">
+                      <a:alpha val="43137"/>
+                    </a:srgbClr>
+                  </a:outerShdw>
+                </a:effectLst>
+              </a:rPr>
               <a:t> commit </a:t>
             </a:r>
             <a:r>
-              <a:rPr lang="en-US" dirty="0" err="1" smtClean="0"/>
+              <a:rPr lang="en-US" b="1" dirty="0" err="1" smtClean="0">
+                <a:solidFill>
+                  <a:srgbClr val="FFFF00"/>
+                </a:solidFill>
+                <a:effectLst>
+                  <a:outerShdw blurRad="38100" dist="38100" dir="2700000" algn="tl">
+                    <a:srgbClr val="000000">
+                      <a:alpha val="43137"/>
+                    </a:srgbClr>
+                  </a:outerShdw>
+                </a:effectLst>
+              </a:rPr>
               <a:t>FileName</a:t>
             </a:r>
             <a:r>
-              <a:rPr lang="en-US" dirty="0" smtClean="0"/>
-              <a:t> –m “Message Text</a:t>
-            </a:r>
-            <a:r>
-              <a:rPr lang="en-US" dirty="0" smtClean="0"/>
-              <a:t>”</a:t>
+              <a:rPr lang="en-US" b="1" dirty="0" smtClean="0">
+                <a:solidFill>
+                  <a:srgbClr val="FFFF00"/>
+                </a:solidFill>
+                <a:effectLst>
+                  <a:outerShdw blurRad="38100" dist="38100" dir="2700000" algn="tl">
+                    <a:srgbClr val="000000">
+                      <a:alpha val="43137"/>
+                    </a:srgbClr>
+                  </a:outerShdw>
+                </a:effectLst>
+              </a:rPr>
+              <a:t> –m “Message Text”</a:t>
             </a:r>
           </a:p>
           <a:p>
@@ -7737,20 +7960,49 @@
           </a:p>
           <a:p>
             <a:r>
-              <a:rPr lang="en-US" dirty="0" smtClean="0"/>
+              <a:rPr lang="en-US" b="1" dirty="0" smtClean="0">
+                <a:solidFill>
+                  <a:srgbClr val="FFFF00"/>
+                </a:solidFill>
+                <a:effectLst>
+                  <a:outerShdw blurRad="38100" dist="38100" dir="2700000" algn="tl">
+                    <a:srgbClr val="000000">
+                      <a:alpha val="43137"/>
+                    </a:srgbClr>
+                  </a:outerShdw>
+                </a:effectLst>
+              </a:rPr>
               <a:t>$ </a:t>
             </a:r>
             <a:r>
-              <a:rPr lang="en-US" dirty="0" err="1" smtClean="0"/>
+              <a:rPr lang="en-US" b="1" dirty="0" err="1" smtClean="0">
+                <a:solidFill>
+                  <a:srgbClr val="FFFF00"/>
+                </a:solidFill>
+                <a:effectLst>
+                  <a:outerShdw blurRad="38100" dist="38100" dir="2700000" algn="tl">
+                    <a:srgbClr val="000000">
+                      <a:alpha val="43137"/>
+                    </a:srgbClr>
+                  </a:outerShdw>
+                </a:effectLst>
+              </a:rPr>
               <a:t>git</a:t>
             </a:r>
             <a:r>
-              <a:rPr lang="en-US" dirty="0" smtClean="0"/>
-              <a:t> commit –a –m “Message Text</a:t>
-            </a:r>
-            <a:r>
-              <a:rPr lang="en-US" dirty="0" smtClean="0"/>
-              <a:t>”</a:t>
+              <a:rPr lang="en-US" b="1" dirty="0" smtClean="0">
+                <a:solidFill>
+                  <a:srgbClr val="FFFF00"/>
+                </a:solidFill>
+                <a:effectLst>
+                  <a:outerShdw blurRad="38100" dist="38100" dir="2700000" algn="tl">
+                    <a:srgbClr val="000000">
+                      <a:alpha val="43137"/>
+                    </a:srgbClr>
+                  </a:outerShdw>
+                </a:effectLst>
+              </a:rPr>
+              <a:t> commit –a –m “Message Text”</a:t>
             </a:r>
           </a:p>
           <a:p>
@@ -7825,30 +8077,426 @@
         </p:nvSpPr>
         <p:spPr/>
         <p:txBody>
+          <a:bodyPr>
+            <a:normAutofit fontScale="92500" lnSpcReduction="10000"/>
+          </a:bodyPr>
+          <a:lstStyle/>
+          <a:p>
+            <a:r>
+              <a:rPr lang="en-US" dirty="0" smtClean="0"/>
+              <a:t>Pull any changes in first</a:t>
+            </a:r>
+            <a:endParaRPr lang="en-US" dirty="0" smtClean="0"/>
+          </a:p>
+          <a:p>
+            <a:pPr lvl="1"/>
+            <a:r>
+              <a:rPr lang="en-US" b="1" dirty="0" smtClean="0">
+                <a:solidFill>
+                  <a:srgbClr val="FFFF00"/>
+                </a:solidFill>
+                <a:effectLst>
+                  <a:outerShdw blurRad="38100" dist="38100" dir="2700000" algn="tl">
+                    <a:srgbClr val="000000">
+                      <a:alpha val="43137"/>
+                    </a:srgbClr>
+                  </a:outerShdw>
+                </a:effectLst>
+              </a:rPr>
+              <a:t>$ </a:t>
+            </a:r>
+            <a:r>
+              <a:rPr lang="en-US" b="1" dirty="0" err="1" smtClean="0">
+                <a:solidFill>
+                  <a:srgbClr val="FFFF00"/>
+                </a:solidFill>
+                <a:effectLst>
+                  <a:outerShdw blurRad="38100" dist="38100" dir="2700000" algn="tl">
+                    <a:srgbClr val="000000">
+                      <a:alpha val="43137"/>
+                    </a:srgbClr>
+                  </a:outerShdw>
+                </a:effectLst>
+              </a:rPr>
+              <a:t>git</a:t>
+            </a:r>
+            <a:r>
+              <a:rPr lang="en-US" b="1" dirty="0" smtClean="0">
+                <a:solidFill>
+                  <a:srgbClr val="FFFF00"/>
+                </a:solidFill>
+                <a:effectLst>
+                  <a:outerShdw blurRad="38100" dist="38100" dir="2700000" algn="tl">
+                    <a:srgbClr val="000000">
+                      <a:alpha val="43137"/>
+                    </a:srgbClr>
+                  </a:outerShdw>
+                </a:effectLst>
+              </a:rPr>
+              <a:t> </a:t>
+            </a:r>
+            <a:r>
+              <a:rPr lang="en-US" b="1" dirty="0" smtClean="0">
+                <a:solidFill>
+                  <a:srgbClr val="FFFF00"/>
+                </a:solidFill>
+                <a:effectLst>
+                  <a:outerShdw blurRad="38100" dist="38100" dir="2700000" algn="tl">
+                    <a:srgbClr val="000000">
+                      <a:alpha val="43137"/>
+                    </a:srgbClr>
+                  </a:outerShdw>
+                </a:effectLst>
+              </a:rPr>
+              <a:t>pull </a:t>
+            </a:r>
+            <a:r>
+              <a:rPr lang="en-US" b="1" dirty="0" smtClean="0">
+                <a:solidFill>
+                  <a:srgbClr val="FFFF00"/>
+                </a:solidFill>
+                <a:effectLst>
+                  <a:outerShdw blurRad="38100" dist="38100" dir="2700000" algn="tl">
+                    <a:srgbClr val="000000">
+                      <a:alpha val="43137"/>
+                    </a:srgbClr>
+                  </a:outerShdw>
+                </a:effectLst>
+              </a:rPr>
+              <a:t>https</a:t>
+            </a:r>
+            <a:r>
+              <a:rPr lang="en-US" b="1" dirty="0" smtClean="0">
+                <a:solidFill>
+                  <a:srgbClr val="FFFF00"/>
+                </a:solidFill>
+                <a:effectLst>
+                  <a:outerShdw blurRad="38100" dist="38100" dir="2700000" algn="tl">
+                    <a:srgbClr val="000000">
+                      <a:alpha val="43137"/>
+                    </a:srgbClr>
+                  </a:outerShdw>
+                </a:effectLst>
+              </a:rPr>
+              <a:t>://</a:t>
+            </a:r>
+            <a:r>
+              <a:rPr lang="en-US" b="1" dirty="0" smtClean="0">
+                <a:solidFill>
+                  <a:srgbClr val="FFFF00"/>
+                </a:solidFill>
+                <a:effectLst>
+                  <a:outerShdw blurRad="38100" dist="38100" dir="2700000" algn="tl">
+                    <a:srgbClr val="000000">
+                      <a:alpha val="43137"/>
+                    </a:srgbClr>
+                  </a:outerShdw>
+                </a:effectLst>
+              </a:rPr>
+              <a:t>github.com/HundredVisionsGuy/techstart-spring-conference</a:t>
+            </a:r>
+            <a:endParaRPr lang="en-US" b="1" dirty="0" smtClean="0">
+              <a:solidFill>
+                <a:srgbClr val="FFFF00"/>
+              </a:solidFill>
+              <a:effectLst>
+                <a:outerShdw blurRad="38100" dist="38100" dir="2700000" algn="tl">
+                  <a:srgbClr val="000000">
+                    <a:alpha val="43137"/>
+                  </a:srgbClr>
+                </a:outerShdw>
+              </a:effectLst>
+            </a:endParaRPr>
+          </a:p>
+          <a:p>
+            <a:r>
+              <a:rPr lang="en-US" dirty="0" smtClean="0"/>
+              <a:t>Add all new changes &amp; commit</a:t>
+            </a:r>
+          </a:p>
+          <a:p>
+            <a:pPr lvl="1"/>
+            <a:r>
+              <a:rPr lang="en-US" b="1" dirty="0" smtClean="0">
+                <a:solidFill>
+                  <a:srgbClr val="FFFF00"/>
+                </a:solidFill>
+                <a:effectLst>
+                  <a:outerShdw blurRad="38100" dist="38100" dir="2700000" algn="tl">
+                    <a:srgbClr val="000000">
+                      <a:alpha val="43137"/>
+                    </a:srgbClr>
+                  </a:outerShdw>
+                </a:effectLst>
+              </a:rPr>
+              <a:t>$ </a:t>
+            </a:r>
+            <a:r>
+              <a:rPr lang="en-US" b="1" dirty="0" err="1" smtClean="0">
+                <a:solidFill>
+                  <a:srgbClr val="FFFF00"/>
+                </a:solidFill>
+                <a:effectLst>
+                  <a:outerShdw blurRad="38100" dist="38100" dir="2700000" algn="tl">
+                    <a:srgbClr val="000000">
+                      <a:alpha val="43137"/>
+                    </a:srgbClr>
+                  </a:outerShdw>
+                </a:effectLst>
+              </a:rPr>
+              <a:t>git</a:t>
+            </a:r>
+            <a:r>
+              <a:rPr lang="en-US" b="1" dirty="0" smtClean="0">
+                <a:solidFill>
+                  <a:srgbClr val="FFFF00"/>
+                </a:solidFill>
+                <a:effectLst>
+                  <a:outerShdw blurRad="38100" dist="38100" dir="2700000" algn="tl">
+                    <a:srgbClr val="000000">
+                      <a:alpha val="43137"/>
+                    </a:srgbClr>
+                  </a:outerShdw>
+                </a:effectLst>
+              </a:rPr>
+              <a:t> add -A</a:t>
+            </a:r>
+          </a:p>
+          <a:p>
+            <a:pPr lvl="1"/>
+            <a:r>
+              <a:rPr lang="en-US" b="1" dirty="0" smtClean="0">
+                <a:solidFill>
+                  <a:srgbClr val="FFFF00"/>
+                </a:solidFill>
+                <a:effectLst>
+                  <a:outerShdw blurRad="38100" dist="38100" dir="2700000" algn="tl">
+                    <a:srgbClr val="000000">
+                      <a:alpha val="43137"/>
+                    </a:srgbClr>
+                  </a:outerShdw>
+                </a:effectLst>
+              </a:rPr>
+              <a:t>$ </a:t>
+            </a:r>
+            <a:r>
+              <a:rPr lang="en-US" b="1" dirty="0" err="1" smtClean="0">
+                <a:solidFill>
+                  <a:srgbClr val="FFFF00"/>
+                </a:solidFill>
+                <a:effectLst>
+                  <a:outerShdw blurRad="38100" dist="38100" dir="2700000" algn="tl">
+                    <a:srgbClr val="000000">
+                      <a:alpha val="43137"/>
+                    </a:srgbClr>
+                  </a:outerShdw>
+                </a:effectLst>
+              </a:rPr>
+              <a:t>git</a:t>
+            </a:r>
+            <a:r>
+              <a:rPr lang="en-US" b="1" dirty="0" smtClean="0">
+                <a:solidFill>
+                  <a:srgbClr val="FFFF00"/>
+                </a:solidFill>
+                <a:effectLst>
+                  <a:outerShdw blurRad="38100" dist="38100" dir="2700000" algn="tl">
+                    <a:srgbClr val="000000">
+                      <a:alpha val="43137"/>
+                    </a:srgbClr>
+                  </a:outerShdw>
+                </a:effectLst>
+              </a:rPr>
+              <a:t> commit –a –m “commit message”</a:t>
+            </a:r>
+          </a:p>
+          <a:p>
+            <a:r>
+              <a:rPr lang="en-US" dirty="0" smtClean="0"/>
+              <a:t>Now, push through</a:t>
+            </a:r>
+            <a:endParaRPr lang="en-US" dirty="0" smtClean="0"/>
+          </a:p>
+          <a:p>
+            <a:pPr lvl="1"/>
+            <a:r>
+              <a:rPr lang="en-US" b="1" dirty="0" smtClean="0">
+                <a:solidFill>
+                  <a:srgbClr val="FFFF00"/>
+                </a:solidFill>
+                <a:effectLst>
+                  <a:outerShdw blurRad="38100" dist="38100" dir="2700000" algn="tl">
+                    <a:srgbClr val="000000">
+                      <a:alpha val="43137"/>
+                    </a:srgbClr>
+                  </a:outerShdw>
+                </a:effectLst>
+              </a:rPr>
+              <a:t>$ </a:t>
+            </a:r>
+            <a:r>
+              <a:rPr lang="en-US" b="1" dirty="0" err="1" smtClean="0">
+                <a:solidFill>
+                  <a:srgbClr val="FFFF00"/>
+                </a:solidFill>
+                <a:effectLst>
+                  <a:outerShdw blurRad="38100" dist="38100" dir="2700000" algn="tl">
+                    <a:srgbClr val="000000">
+                      <a:alpha val="43137"/>
+                    </a:srgbClr>
+                  </a:outerShdw>
+                </a:effectLst>
+              </a:rPr>
+              <a:t>git</a:t>
+            </a:r>
+            <a:r>
+              <a:rPr lang="en-US" b="1" dirty="0" smtClean="0">
+                <a:solidFill>
+                  <a:srgbClr val="FFFF00"/>
+                </a:solidFill>
+                <a:effectLst>
+                  <a:outerShdw blurRad="38100" dist="38100" dir="2700000" algn="tl">
+                    <a:srgbClr val="000000">
+                      <a:alpha val="43137"/>
+                    </a:srgbClr>
+                  </a:outerShdw>
+                </a:effectLst>
+              </a:rPr>
+              <a:t> push</a:t>
+            </a:r>
+          </a:p>
+          <a:p>
+            <a:pPr lvl="1"/>
+            <a:r>
+              <a:rPr lang="en-US" dirty="0" smtClean="0"/>
+              <a:t>NOTE: you’ll need to enter your username and password for the GitHub repository</a:t>
+            </a:r>
+            <a:endParaRPr lang="en-US" dirty="0"/>
+          </a:p>
+        </p:txBody>
+      </p:sp>
+    </p:spTree>
+  </p:cSld>
+  <p:clrMapOvr>
+    <a:masterClrMapping/>
+  </p:clrMapOvr>
+  <p:transition>
+    <p:fade thruBlk="1"/>
+  </p:transition>
+</p:sld>
+</file>
+
+<file path=ppt/slides/slide29.xml><?xml version="1.0" encoding="utf-8"?>
+<p:sld xmlns:a="http://schemas.openxmlformats.org/drawingml/2006/main" xmlns:r="http://schemas.openxmlformats.org/officeDocument/2006/relationships" xmlns:p="http://schemas.openxmlformats.org/presentationml/2006/main">
+  <p:cSld>
+    <p:spTree>
+      <p:nvGrpSpPr>
+        <p:cNvPr id="1" name=""/>
+        <p:cNvGrpSpPr/>
+        <p:nvPr/>
+      </p:nvGrpSpPr>
+      <p:grpSpPr>
+        <a:xfrm>
+          <a:off x="0" y="0"/>
+          <a:ext cx="0" cy="0"/>
+          <a:chOff x="0" y="0"/>
+          <a:chExt cx="0" cy="0"/>
+        </a:xfrm>
+      </p:grpSpPr>
+      <p:sp>
+        <p:nvSpPr>
+          <p:cNvPr id="2" name="Title 1"/>
+          <p:cNvSpPr>
+            <a:spLocks noGrp="1"/>
+          </p:cNvSpPr>
+          <p:nvPr>
+            <p:ph type="title"/>
+          </p:nvPr>
+        </p:nvSpPr>
+        <p:spPr/>
+        <p:txBody>
           <a:bodyPr/>
           <a:lstStyle/>
           <a:p>
             <a:r>
               <a:rPr lang="en-US" dirty="0" smtClean="0"/>
-              <a:t>You might first want to fetch any new changes</a:t>
+              <a:t>If You Never Want to Do Command Line Again</a:t>
+            </a:r>
+            <a:endParaRPr lang="en-US" dirty="0"/>
+          </a:p>
+        </p:txBody>
+      </p:sp>
+      <p:sp>
+        <p:nvSpPr>
+          <p:cNvPr id="3" name="Content Placeholder 2"/>
+          <p:cNvSpPr>
+            <a:spLocks noGrp="1"/>
+          </p:cNvSpPr>
+          <p:nvPr>
+            <p:ph idx="1"/>
+          </p:nvPr>
+        </p:nvSpPr>
+        <p:spPr/>
+        <p:txBody>
+          <a:bodyPr/>
+          <a:lstStyle/>
+          <a:p>
+            <a:r>
+              <a:rPr lang="en-US" dirty="0" smtClean="0"/>
+              <a:t>Download a GUI client for your computer</a:t>
             </a:r>
           </a:p>
           <a:p>
             <a:pPr lvl="1"/>
             <a:r>
-              <a:rPr lang="en-US" dirty="0" smtClean="0"/>
-              <a:t>$ </a:t>
-            </a:r>
-            <a:r>
-              <a:rPr lang="en-US" dirty="0" err="1" smtClean="0"/>
-              <a:t>git</a:t>
-            </a:r>
-            <a:r>
-              <a:rPr lang="en-US" dirty="0" smtClean="0"/>
-              <a:t> fetch upstream</a:t>
-            </a:r>
-          </a:p>
-          <a:p>
+              <a:rPr lang="en-US" dirty="0" smtClean="0">
+                <a:hlinkClick r:id="rId2"/>
+              </a:rPr>
+              <a:t>GitHub for Windows</a:t>
+            </a:r>
+            <a:endParaRPr lang="en-US" dirty="0" smtClean="0"/>
+          </a:p>
+          <a:p>
+            <a:pPr lvl="1"/>
+            <a:r>
+              <a:rPr lang="en-US" dirty="0" smtClean="0">
+                <a:hlinkClick r:id="rId3"/>
+              </a:rPr>
+              <a:t>GitHub for Mac</a:t>
+            </a:r>
+            <a:endParaRPr lang="en-US" dirty="0" smtClean="0"/>
+          </a:p>
+          <a:p>
+            <a:pPr lvl="1"/>
+            <a:r>
+              <a:rPr lang="en-US" dirty="0" smtClean="0">
+                <a:hlinkClick r:id="rId4"/>
+              </a:rPr>
+              <a:t>GitHub Mobile</a:t>
+            </a:r>
+            <a:endParaRPr lang="en-US" dirty="0" smtClean="0"/>
+          </a:p>
+          <a:p>
+            <a:pPr lvl="1"/>
+            <a:r>
+              <a:rPr lang="en-US" dirty="0" smtClean="0">
+                <a:hlinkClick r:id="rId5"/>
+              </a:rPr>
+              <a:t>Git – Downloads</a:t>
+            </a:r>
+            <a:r>
+              <a:rPr lang="en-US" dirty="0" smtClean="0"/>
+              <a:t> (comes with a simple GUI)</a:t>
+            </a:r>
+          </a:p>
+          <a:p>
+            <a:pPr lvl="1"/>
+            <a:r>
+              <a:rPr lang="en-US" dirty="0" smtClean="0">
+                <a:hlinkClick r:id="rId6"/>
+              </a:rPr>
+              <a:t>More GUI Clients</a:t>
+            </a:r>
             <a:endParaRPr lang="en-US" dirty="0"/>
           </a:p>
         </p:txBody>
@@ -7985,6 +8633,136 @@
       </p:par>
     </p:tnLst>
   </p:timing>
+</p:sld>
+</file>
+
+<file path=ppt/slides/slide30.xml><?xml version="1.0" encoding="utf-8"?>
+<p:sld xmlns:a="http://schemas.openxmlformats.org/drawingml/2006/main" xmlns:r="http://schemas.openxmlformats.org/officeDocument/2006/relationships" xmlns:p="http://schemas.openxmlformats.org/presentationml/2006/main">
+  <p:cSld>
+    <p:spTree>
+      <p:nvGrpSpPr>
+        <p:cNvPr id="1" name=""/>
+        <p:cNvGrpSpPr/>
+        <p:nvPr/>
+      </p:nvGrpSpPr>
+      <p:grpSpPr>
+        <a:xfrm>
+          <a:off x="0" y="0"/>
+          <a:ext cx="0" cy="0"/>
+          <a:chOff x="0" y="0"/>
+          <a:chExt cx="0" cy="0"/>
+        </a:xfrm>
+      </p:grpSpPr>
+      <p:sp>
+        <p:nvSpPr>
+          <p:cNvPr id="2" name="Title 1"/>
+          <p:cNvSpPr>
+            <a:spLocks noGrp="1"/>
+          </p:cNvSpPr>
+          <p:nvPr>
+            <p:ph type="title"/>
+          </p:nvPr>
+        </p:nvSpPr>
+        <p:spPr/>
+        <p:txBody>
+          <a:bodyPr/>
+          <a:lstStyle/>
+          <a:p>
+            <a:r>
+              <a:rPr lang="en-US" dirty="0" smtClean="0"/>
+              <a:t>For More Information</a:t>
+            </a:r>
+            <a:endParaRPr lang="en-US" dirty="0"/>
+          </a:p>
+        </p:txBody>
+      </p:sp>
+      <p:sp>
+        <p:nvSpPr>
+          <p:cNvPr id="3" name="Content Placeholder 2"/>
+          <p:cNvSpPr>
+            <a:spLocks noGrp="1"/>
+          </p:cNvSpPr>
+          <p:nvPr>
+            <p:ph idx="1"/>
+          </p:nvPr>
+        </p:nvSpPr>
+        <p:spPr/>
+        <p:txBody>
+          <a:bodyPr/>
+          <a:lstStyle/>
+          <a:p>
+            <a:r>
+              <a:rPr lang="en-US" dirty="0" smtClean="0">
+                <a:hlinkClick r:id="rId2"/>
+              </a:rPr>
+              <a:t>Basic Git Command Line Reference for Windows </a:t>
+            </a:r>
+            <a:r>
+              <a:rPr lang="en-US" dirty="0" smtClean="0">
+                <a:hlinkClick r:id="rId2"/>
+              </a:rPr>
+              <a:t>Users</a:t>
+            </a:r>
+            <a:endParaRPr lang="en-US" dirty="0" smtClean="0"/>
+          </a:p>
+          <a:p>
+            <a:r>
+              <a:rPr lang="en-US" dirty="0" smtClean="0">
+                <a:hlinkClick r:id="rId3"/>
+              </a:rPr>
+              <a:t>GitHub </a:t>
+            </a:r>
+            <a:r>
+              <a:rPr lang="en-US" dirty="0" err="1" smtClean="0">
+                <a:hlinkClick r:id="rId3"/>
+              </a:rPr>
+              <a:t>Bootcamp</a:t>
+            </a:r>
+            <a:endParaRPr lang="en-US" dirty="0" smtClean="0"/>
+          </a:p>
+          <a:p>
+            <a:r>
+              <a:rPr lang="en-US" dirty="0" smtClean="0">
+                <a:hlinkClick r:id="rId4"/>
+              </a:rPr>
+              <a:t>BitBucket 101 </a:t>
+            </a:r>
+            <a:r>
+              <a:rPr lang="en-US" dirty="0" smtClean="0"/>
+              <a:t>– covers both Mercurial and Git</a:t>
+            </a:r>
+          </a:p>
+          <a:p>
+            <a:r>
+              <a:rPr lang="en-US" dirty="0" smtClean="0">
+                <a:hlinkClick r:id="rId5"/>
+              </a:rPr>
+              <a:t>Git Basics</a:t>
+            </a:r>
+            <a:endParaRPr lang="en-US" dirty="0" smtClean="0"/>
+          </a:p>
+          <a:p>
+            <a:r>
+              <a:rPr lang="en-US" dirty="0" smtClean="0">
+                <a:hlinkClick r:id="rId6"/>
+              </a:rPr>
+              <a:t>Pro Git </a:t>
+            </a:r>
+            <a:r>
+              <a:rPr lang="en-US" dirty="0" smtClean="0"/>
+              <a:t>– complete online (and free) book all about Git</a:t>
+            </a:r>
+          </a:p>
+        </p:txBody>
+      </p:sp>
+    </p:spTree>
+  </p:cSld>
+  <p:clrMapOvr>
+    <a:masterClrMapping/>
+  </p:clrMapOvr>
+  <p:transition>
+    <p:fade thruBlk="1"/>
+  </p:transition>
 </p:sld>
 </file>
 
@@ -8563,7 +9341,7 @@
           <a:blip r:embed="rId2" cstate="print">
             <a:extLst>
               <a:ext uri="{28A0092B-C50C-407E-A947-70E740481C1C}">
-                <a14:useLocalDpi xmlns:a14="http://schemas.microsoft.com/office/drawing/2010/main" xmlns="" val="0"/>
+                <a14:useLocalDpi xmlns="" xmlns:a14="http://schemas.microsoft.com/office/drawing/2010/main" val="0"/>
               </a:ext>
             </a:extLst>
           </a:blip>
@@ -8587,14 +9365,14 @@
           <a:effectLst/>
           <a:extLst>
             <a:ext uri="{909E8E84-426E-40DD-AFC4-6F175D3DCCD1}">
-              <a14:hiddenFill xmlns:a14="http://schemas.microsoft.com/office/drawing/2010/main" xmlns="">
+              <a14:hiddenFill xmlns="" xmlns:a14="http://schemas.microsoft.com/office/drawing/2010/main">
                 <a:solidFill>
                   <a:schemeClr val="accent1"/>
                 </a:solidFill>
               </a14:hiddenFill>
             </a:ext>
             <a:ext uri="{91240B29-F687-4F45-9708-019B960494DF}">
-              <a14:hiddenLine xmlns:a14="http://schemas.microsoft.com/office/drawing/2010/main" xmlns="" w="9525">
+              <a14:hiddenLine xmlns="" xmlns:a14="http://schemas.microsoft.com/office/drawing/2010/main" w="9525">
                 <a:solidFill>
                   <a:schemeClr val="tx1"/>
                 </a:solidFill>
@@ -8604,7 +9382,7 @@
               </a14:hiddenLine>
             </a:ext>
             <a:ext uri="{AF507438-7753-43E0-B8FC-AC1667EBCBE1}">
-              <a14:hiddenEffects xmlns:a14="http://schemas.microsoft.com/office/drawing/2010/main" xmlns="">
+              <a14:hiddenEffects xmlns="" xmlns:a14="http://schemas.microsoft.com/office/drawing/2010/main">
                 <a:effectLst>
                   <a:outerShdw dist="35921" dir="2700000" algn="ctr" rotWithShape="0">
                     <a:schemeClr val="bg2"/>
@@ -8618,7 +9396,7 @@
     </p:spTree>
     <p:extLst>
       <p:ext uri="{BB962C8B-B14F-4D97-AF65-F5344CB8AC3E}">
-        <p14:creationId xmlns:p14="http://schemas.microsoft.com/office/powerpoint/2010/main" xmlns="" val="3529348580"/>
+        <p14:creationId xmlns="" xmlns:p14="http://schemas.microsoft.com/office/powerpoint/2010/main" val="3529348580"/>
       </p:ext>
     </p:extLst>
   </p:cSld>

</xml_diff>

<commit_message>
Added SuperQuest Link edited Presentation
</commit_message>
<xml_diff>
--- a/Resources/Version Control Presentation.pptx
+++ b/Resources/Version Control Presentation.pptx
@@ -4545,6 +4545,10 @@
           </p:nvPr>
         </p:nvSpPr>
         <p:spPr>
+          <a:xfrm>
+            <a:off x="3657600" y="1752600"/>
+            <a:ext cx="5410200" cy="1371600"/>
+          </a:xfrm>
           <a:ln>
             <a:solidFill>
               <a:schemeClr val="accent1"/>
@@ -4589,7 +4593,12 @@
             <p:ph type="subTitle" idx="1"/>
           </p:nvPr>
         </p:nvSpPr>
-        <p:spPr/>
+        <p:spPr>
+          <a:xfrm>
+            <a:off x="2895600" y="3352800"/>
+            <a:ext cx="6172200" cy="533400"/>
+          </a:xfrm>
+        </p:spPr>
         <p:txBody>
           <a:bodyPr/>
           <a:lstStyle/>
@@ -4632,7 +4641,9 @@
               </a:rPr>
               <a:t> Spring Conference 2013</a:t>
             </a:r>
-            <a:endParaRPr lang="en-US" dirty="0">
+          </a:p>
+          <a:p>
+            <a:endParaRPr lang="en-US" dirty="0" smtClean="0">
               <a:effectLst>
                 <a:outerShdw blurRad="38100" dist="38100" dir="2700000" algn="tl">
                   <a:srgbClr val="000000">
@@ -6067,6 +6078,13 @@
   <p:transition>
     <p:fade thruBlk="1"/>
   </p:transition>
+  <p:timing>
+    <p:tnLst>
+      <p:par>
+        <p:cTn id="1" dur="indefinite" restart="never" nodeType="tmRoot"/>
+      </p:par>
+    </p:tnLst>
+  </p:timing>
 </p:sld>
 </file>
 
@@ -6752,6 +6770,13 @@
   <p:transition>
     <p:fade thruBlk="1"/>
   </p:transition>
+  <p:timing>
+    <p:tnLst>
+      <p:par>
+        <p:cTn id="1" dur="indefinite" restart="never" nodeType="tmRoot"/>
+      </p:par>
+    </p:tnLst>
+  </p:timing>
 </p:sld>
 </file>
 
@@ -6839,6 +6864,13 @@
   <p:transition>
     <p:fade thruBlk="1"/>
   </p:transition>
+  <p:timing>
+    <p:tnLst>
+      <p:par>
+        <p:cTn id="1" dur="indefinite" restart="never" nodeType="tmRoot"/>
+      </p:par>
+    </p:tnLst>
+  </p:timing>
 </p:sld>
 </file>
 
@@ -7233,6 +7265,13 @@
   <p:transition>
     <p:fade thruBlk="1"/>
   </p:transition>
+  <p:timing>
+    <p:tnLst>
+      <p:par>
+        <p:cTn id="1" dur="indefinite" restart="never" nodeType="tmRoot"/>
+      </p:par>
+    </p:tnLst>
+  </p:timing>
 </p:sld>
 </file>
 
@@ -7637,6 +7676,13 @@
   <p:transition>
     <p:fade thruBlk="1"/>
   </p:transition>
+  <p:timing>
+    <p:tnLst>
+      <p:par>
+        <p:cTn id="1" dur="indefinite" restart="never" nodeType="tmRoot"/>
+      </p:par>
+    </p:tnLst>
+  </p:timing>
 </p:sld>
 </file>
 
@@ -7809,6 +7855,13 @@
   <p:transition>
     <p:fade thruBlk="1"/>
   </p:transition>
+  <p:timing>
+    <p:tnLst>
+      <p:par>
+        <p:cTn id="1" dur="indefinite" restart="never" nodeType="tmRoot"/>
+      </p:par>
+    </p:tnLst>
+  </p:timing>
 </p:sld>
 </file>
 
@@ -8086,7 +8139,6 @@
               <a:rPr lang="en-US" dirty="0" smtClean="0"/>
               <a:t>Pull any changes in first</a:t>
             </a:r>
-            <a:endParaRPr lang="en-US" dirty="0" smtClean="0"/>
           </a:p>
           <a:p>
             <a:pPr lvl="1"/>
@@ -8133,80 +8185,8 @@
                   </a:outerShdw>
                 </a:effectLst>
               </a:rPr>
-              <a:t> </a:t>
-            </a:r>
-            <a:r>
-              <a:rPr lang="en-US" b="1" dirty="0" smtClean="0">
-                <a:solidFill>
-                  <a:srgbClr val="FFFF00"/>
-                </a:solidFill>
-                <a:effectLst>
-                  <a:outerShdw blurRad="38100" dist="38100" dir="2700000" algn="tl">
-                    <a:srgbClr val="000000">
-                      <a:alpha val="43137"/>
-                    </a:srgbClr>
-                  </a:outerShdw>
-                </a:effectLst>
-              </a:rPr>
-              <a:t>pull </a:t>
-            </a:r>
-            <a:r>
-              <a:rPr lang="en-US" b="1" dirty="0" smtClean="0">
-                <a:solidFill>
-                  <a:srgbClr val="FFFF00"/>
-                </a:solidFill>
-                <a:effectLst>
-                  <a:outerShdw blurRad="38100" dist="38100" dir="2700000" algn="tl">
-                    <a:srgbClr val="000000">
-                      <a:alpha val="43137"/>
-                    </a:srgbClr>
-                  </a:outerShdw>
-                </a:effectLst>
-              </a:rPr>
-              <a:t>https</a:t>
-            </a:r>
-            <a:r>
-              <a:rPr lang="en-US" b="1" dirty="0" smtClean="0">
-                <a:solidFill>
-                  <a:srgbClr val="FFFF00"/>
-                </a:solidFill>
-                <a:effectLst>
-                  <a:outerShdw blurRad="38100" dist="38100" dir="2700000" algn="tl">
-                    <a:srgbClr val="000000">
-                      <a:alpha val="43137"/>
-                    </a:srgbClr>
-                  </a:outerShdw>
-                </a:effectLst>
-              </a:rPr>
-              <a:t>://</a:t>
-            </a:r>
-            <a:r>
-              <a:rPr lang="en-US" b="1" dirty="0" smtClean="0">
-                <a:solidFill>
-                  <a:srgbClr val="FFFF00"/>
-                </a:solidFill>
-                <a:effectLst>
-                  <a:outerShdw blurRad="38100" dist="38100" dir="2700000" algn="tl">
-                    <a:srgbClr val="000000">
-                      <a:alpha val="43137"/>
-                    </a:srgbClr>
-                  </a:outerShdw>
-                </a:effectLst>
-              </a:rPr>
-              <a:t>github.com/HundredVisionsGuy/techstart-spring-conference</a:t>
-            </a:r>
-            <a:endParaRPr lang="en-US" b="1" dirty="0" smtClean="0">
-              <a:solidFill>
-                <a:srgbClr val="FFFF00"/>
-              </a:solidFill>
-              <a:effectLst>
-                <a:outerShdw blurRad="38100" dist="38100" dir="2700000" algn="tl">
-                  <a:srgbClr val="000000">
-                    <a:alpha val="43137"/>
-                  </a:srgbClr>
-                </a:outerShdw>
-              </a:effectLst>
-            </a:endParaRPr>
+              <a:t> pull https://github.com/HundredVisionsGuy/techstart-spring-conference</a:t>
+            </a:r>
           </a:p>
           <a:p>
             <a:r>
@@ -8315,7 +8295,6 @@
               <a:rPr lang="en-US" dirty="0" smtClean="0"/>
               <a:t>Now, push through</a:t>
             </a:r>
-            <a:endParaRPr lang="en-US" dirty="0" smtClean="0"/>
           </a:p>
           <a:p>
             <a:pPr lvl="1"/>
@@ -8695,13 +8674,7 @@
               <a:rPr lang="en-US" dirty="0" smtClean="0">
                 <a:hlinkClick r:id="rId2"/>
               </a:rPr>
-              <a:t>Basic Git Command Line Reference for Windows </a:t>
-            </a:r>
-            <a:r>
-              <a:rPr lang="en-US" dirty="0" smtClean="0">
-                <a:hlinkClick r:id="rId2"/>
-              </a:rPr>
-              <a:t>Users</a:t>
+              <a:t>Basic Git Command Line Reference for Windows Users</a:t>
             </a:r>
             <a:endParaRPr lang="en-US" dirty="0" smtClean="0"/>
           </a:p>

</xml_diff>